<commit_message>
Update E-commerce Resilience Defense.pptx
</commit_message>
<xml_diff>
--- a/E-commerce Resilience Defense.pptx
+++ b/E-commerce Resilience Defense.pptx
@@ -1633,7 +1633,7 @@
             <a:fld id="{5923F103-BC34-4FE4-A40E-EDDEECFDA5D0}" type="datetimeFigureOut">
               <a:rPr lang="en-US" smtClean="0"/>
               <a:pPr/>
-              <a:t>1/28/2026</a:t>
+              <a:t>1/29/2026</a:t>
             </a:fld>
             <a:endParaRPr lang="en-US" dirty="0"/>
           </a:p>
@@ -2735,7 +2735,7 @@
           <a:p>
             <a:fld id="{2BE451C3-0FF4-47C4-B829-773ADF60F88C}" type="datetimeFigureOut">
               <a:rPr lang="en-US" smtClean="0"/>
-              <a:t>1/28/2026</a:t>
+              <a:t>1/29/2026</a:t>
             </a:fld>
             <a:endParaRPr lang="en-US" dirty="0"/>
           </a:p>
@@ -3722,7 +3722,7 @@
           <a:p>
             <a:fld id="{2BE451C3-0FF4-47C4-B829-773ADF60F88C}" type="datetimeFigureOut">
               <a:rPr lang="en-US" smtClean="0"/>
-              <a:t>1/28/2026</a:t>
+              <a:t>1/29/2026</a:t>
             </a:fld>
             <a:endParaRPr lang="en-US" dirty="0"/>
           </a:p>
@@ -4863,7 +4863,7 @@
           <a:p>
             <a:fld id="{2BE451C3-0FF4-47C4-B829-773ADF60F88C}" type="datetimeFigureOut">
               <a:rPr lang="en-US" smtClean="0"/>
-              <a:t>1/28/2026</a:t>
+              <a:t>1/29/2026</a:t>
             </a:fld>
             <a:endParaRPr lang="en-US" dirty="0"/>
           </a:p>
@@ -5903,7 +5903,7 @@
           <a:p>
             <a:fld id="{2BE451C3-0FF4-47C4-B829-773ADF60F88C}" type="datetimeFigureOut">
               <a:rPr lang="en-US" smtClean="0"/>
-              <a:t>1/28/2026</a:t>
+              <a:t>1/29/2026</a:t>
             </a:fld>
             <a:endParaRPr lang="en-US" dirty="0"/>
           </a:p>
@@ -6570,7 +6570,7 @@
           <a:p>
             <a:fld id="{2BE451C3-0FF4-47C4-B829-773ADF60F88C}" type="datetimeFigureOut">
               <a:rPr lang="en-US" smtClean="0"/>
-              <a:t>1/28/2026</a:t>
+              <a:t>1/29/2026</a:t>
             </a:fld>
             <a:endParaRPr lang="en-US" dirty="0"/>
           </a:p>
@@ -7438,7 +7438,7 @@
           <a:p>
             <a:fld id="{2BE451C3-0FF4-47C4-B829-773ADF60F88C}" type="datetimeFigureOut">
               <a:rPr lang="en-US" smtClean="0"/>
-              <a:t>1/28/2026</a:t>
+              <a:t>1/29/2026</a:t>
             </a:fld>
             <a:endParaRPr lang="en-US" dirty="0"/>
           </a:p>
@@ -7635,7 +7635,7 @@
           <a:p>
             <a:fld id="{53086D93-FCAC-47E0-A2EE-787E62CA814C}" type="datetimeFigureOut">
               <a:rPr lang="en-US" smtClean="0"/>
-              <a:t>1/28/2026</a:t>
+              <a:t>1/29/2026</a:t>
             </a:fld>
             <a:endParaRPr lang="en-US" dirty="0"/>
           </a:p>
@@ -8614,7 +8614,7 @@
           <a:p>
             <a:fld id="{CDA879A6-0FD0-4734-A311-86BFCA472E6E}" type="datetimeFigureOut">
               <a:rPr lang="en-US" smtClean="0"/>
-              <a:t>1/28/2026</a:t>
+              <a:t>1/29/2026</a:t>
             </a:fld>
             <a:endParaRPr lang="en-US" dirty="0"/>
           </a:p>
@@ -8867,7 +8867,7 @@
           <a:p>
             <a:fld id="{19C9CA7B-DFD4-44B5-8C60-D14B8CD1FB59}" type="datetimeFigureOut">
               <a:rPr lang="en-US" smtClean="0"/>
-              <a:t>1/28/2026</a:t>
+              <a:t>1/29/2026</a:t>
             </a:fld>
             <a:endParaRPr lang="en-US" dirty="0"/>
           </a:p>
@@ -9908,7 +9908,7 @@
           <a:p>
             <a:fld id="{F34E6425-0181-43F2-84FC-787E803FD2F8}" type="datetimeFigureOut">
               <a:rPr lang="en-US" smtClean="0"/>
-              <a:t>1/28/2026</a:t>
+              <a:t>1/29/2026</a:t>
             </a:fld>
             <a:endParaRPr lang="en-US" dirty="0"/>
           </a:p>
@@ -10187,7 +10187,7 @@
           <a:p>
             <a:fld id="{3BDB8791-F1B0-41E7-B7FD-A781E65C4266}" type="datetimeFigureOut">
               <a:rPr lang="en-US" smtClean="0"/>
-              <a:t>1/28/2026</a:t>
+              <a:t>1/29/2026</a:t>
             </a:fld>
             <a:endParaRPr lang="en-US" dirty="0"/>
           </a:p>
@@ -10604,7 +10604,7 @@
           <a:p>
             <a:fld id="{5FDD63B2-E120-4ED8-B27B-C685F510A5FE}" type="datetimeFigureOut">
               <a:rPr lang="en-US" smtClean="0"/>
-              <a:t>1/28/2026</a:t>
+              <a:t>1/29/2026</a:t>
             </a:fld>
             <a:endParaRPr lang="en-US" dirty="0"/>
           </a:p>
@@ -10738,7 +10738,7 @@
           <a:p>
             <a:fld id="{7AA18ACC-A947-437B-A130-35BD54FDF1E9}" type="datetimeFigureOut">
               <a:rPr lang="en-US" smtClean="0"/>
-              <a:t>1/28/2026</a:t>
+              <a:t>1/29/2026</a:t>
             </a:fld>
             <a:endParaRPr lang="en-US" dirty="0"/>
           </a:p>
@@ -10840,7 +10840,7 @@
           <a:p>
             <a:fld id="{7C8D7E02-BCB8-4D50-A234-369438C08659}" type="datetimeFigureOut">
               <a:rPr lang="en-US" smtClean="0"/>
-              <a:t>1/28/2026</a:t>
+              <a:t>1/29/2026</a:t>
             </a:fld>
             <a:endParaRPr lang="en-US" dirty="0"/>
           </a:p>
@@ -11928,7 +11928,7 @@
           <a:p>
             <a:fld id="{76E86A4C-8E40-4F87-A4F0-01A0687C5742}" type="datetimeFigureOut">
               <a:rPr lang="en-US" smtClean="0"/>
-              <a:t>1/28/2026</a:t>
+              <a:t>1/29/2026</a:t>
             </a:fld>
             <a:endParaRPr lang="en-US" dirty="0"/>
           </a:p>
@@ -13043,7 +13043,7 @@
           <a:p>
             <a:fld id="{35E72C73-2D91-4E12-BA25-F0AA0C03599B}" type="datetimeFigureOut">
               <a:rPr lang="en-US" smtClean="0"/>
-              <a:t>1/28/2026</a:t>
+              <a:t>1/29/2026</a:t>
             </a:fld>
             <a:endParaRPr lang="en-US" dirty="0"/>
           </a:p>
@@ -14110,7 +14110,7 @@
           <a:p>
             <a:fld id="{2BE451C3-0FF4-47C4-B829-773ADF60F88C}" type="datetimeFigureOut">
               <a:rPr lang="en-US" smtClean="0"/>
-              <a:t>1/28/2026</a:t>
+              <a:t>1/29/2026</a:t>
             </a:fld>
             <a:endParaRPr lang="en-US" dirty="0"/>
           </a:p>
@@ -15180,8 +15180,8 @@
         </p:nvSpPr>
         <p:spPr>
           <a:xfrm>
-            <a:off x="2341917" y="2142827"/>
-            <a:ext cx="4211973" cy="239911"/>
+            <a:off x="182880" y="2142827"/>
+            <a:ext cx="8193025" cy="411361"/>
           </a:xfrm>
           <a:prstGeom prst="rect">
             <a:avLst/>
@@ -15200,14 +15200,14 @@
               <a:buNone/>
             </a:pPr>
             <a:r>
-              <a:rPr lang="en-US" sz="1350" dirty="0">
+              <a:rPr lang="en-US" sz="1600" dirty="0">
                 <a:latin typeface="Arial" pitchFamily="34" charset="0"/>
                 <a:ea typeface="Arial" pitchFamily="34" charset="-122"/>
                 <a:cs typeface="Arial" pitchFamily="34" charset="-120"/>
               </a:rPr>
               <a:t>💡 Інвестувати в цифрову інфраструктуру</a:t>
             </a:r>
-            <a:endParaRPr lang="en-US" sz="1350" dirty="0"/>
+            <a:endParaRPr lang="en-US" sz="1600" dirty="0"/>
           </a:p>
         </p:txBody>
       </p:sp>
@@ -15219,8 +15219,8 @@
         </p:nvSpPr>
         <p:spPr>
           <a:xfrm>
-            <a:off x="2341917" y="2611338"/>
-            <a:ext cx="4211973" cy="239911"/>
+            <a:off x="182880" y="2611338"/>
+            <a:ext cx="8193025" cy="411361"/>
           </a:xfrm>
           <a:prstGeom prst="rect">
             <a:avLst/>
@@ -15239,7 +15239,7 @@
               <a:buNone/>
             </a:pPr>
             <a:r>
-              <a:rPr lang="en-US" sz="1350" dirty="0">
+              <a:rPr lang="en-US" sz="1600" dirty="0">
                 <a:latin typeface="Arial" pitchFamily="34" charset="0"/>
                 <a:ea typeface="Arial" pitchFamily="34" charset="-122"/>
                 <a:cs typeface="Arial" pitchFamily="34" charset="-120"/>
@@ -15247,7 +15247,7 @@
               <a:t>💡 </a:t>
             </a:r>
             <a:r>
-              <a:rPr lang="en-US" sz="1350" dirty="0" err="1">
+              <a:rPr lang="en-US" sz="1600" dirty="0" err="1">
                 <a:latin typeface="Arial" pitchFamily="34" charset="0"/>
                 <a:ea typeface="Arial" pitchFamily="34" charset="-122"/>
                 <a:cs typeface="Arial" pitchFamily="34" charset="-120"/>
@@ -15255,7 +15255,7 @@
               <a:t>Розширити</a:t>
             </a:r>
             <a:r>
-              <a:rPr lang="en-US" sz="1350" dirty="0">
+              <a:rPr lang="en-US" sz="1600" dirty="0">
                 <a:latin typeface="Arial" pitchFamily="34" charset="0"/>
                 <a:ea typeface="Arial" pitchFamily="34" charset="-122"/>
                 <a:cs typeface="Arial" pitchFamily="34" charset="-120"/>
@@ -15263,7 +15263,7 @@
               <a:t> </a:t>
             </a:r>
             <a:r>
-              <a:rPr lang="uk-UA" sz="1350" dirty="0">
+              <a:rPr lang="uk-UA" sz="1600" dirty="0">
                 <a:latin typeface="Arial" pitchFamily="34" charset="0"/>
                 <a:ea typeface="Arial" pitchFamily="34" charset="-122"/>
                 <a:cs typeface="Arial" pitchFamily="34" charset="-120"/>
@@ -15271,7 +15271,7 @@
               <a:t>швидкісний </a:t>
             </a:r>
             <a:r>
-              <a:rPr lang="en-US" sz="1350" dirty="0" err="1">
+              <a:rPr lang="en-US" sz="1600" dirty="0" err="1">
                 <a:latin typeface="Arial" pitchFamily="34" charset="0"/>
                 <a:ea typeface="Arial" pitchFamily="34" charset="-122"/>
                 <a:cs typeface="Arial" pitchFamily="34" charset="-120"/>
@@ -15279,14 +15279,14 @@
               <a:t>доступ</a:t>
             </a:r>
             <a:r>
-              <a:rPr lang="en-US" sz="1350" dirty="0">
+              <a:rPr lang="en-US" sz="1600" dirty="0">
                 <a:latin typeface="Arial" pitchFamily="34" charset="0"/>
                 <a:ea typeface="Arial" pitchFamily="34" charset="-122"/>
                 <a:cs typeface="Arial" pitchFamily="34" charset="-120"/>
               </a:rPr>
               <a:t> до інтернету для усіх регіонів</a:t>
             </a:r>
-            <a:endParaRPr lang="en-US" sz="1350" dirty="0"/>
+            <a:endParaRPr lang="en-US" sz="1600" dirty="0"/>
           </a:p>
         </p:txBody>
       </p:sp>
@@ -15298,8 +15298,8 @@
         </p:nvSpPr>
         <p:spPr>
           <a:xfrm>
-            <a:off x="2341916" y="3245048"/>
-            <a:ext cx="4211973" cy="239911"/>
+            <a:off x="182879" y="3245048"/>
+            <a:ext cx="8193025" cy="411361"/>
           </a:xfrm>
           <a:prstGeom prst="rect">
             <a:avLst/>
@@ -15318,14 +15318,46 @@
               <a:buNone/>
             </a:pPr>
             <a:r>
-              <a:rPr lang="en-US" sz="1350" dirty="0">
-                <a:latin typeface="Arial" pitchFamily="34" charset="0"/>
-                <a:ea typeface="Arial" pitchFamily="34" charset="-122"/>
-                <a:cs typeface="Arial" pitchFamily="34" charset="-120"/>
-              </a:rPr>
-              <a:t>💡 Підтримувати СМВО в цифровій трансформації</a:t>
-            </a:r>
-            <a:endParaRPr lang="en-US" sz="1350" dirty="0"/>
+              <a:rPr lang="en-US" sz="1600" dirty="0">
+                <a:latin typeface="Arial" pitchFamily="34" charset="0"/>
+                <a:ea typeface="Arial" pitchFamily="34" charset="-122"/>
+                <a:cs typeface="Arial" pitchFamily="34" charset="-120"/>
+              </a:rPr>
+              <a:t>💡 </a:t>
+            </a:r>
+            <a:r>
+              <a:rPr lang="en-US" sz="1600" dirty="0" err="1">
+                <a:latin typeface="Arial" pitchFamily="34" charset="0"/>
+                <a:ea typeface="Arial" pitchFamily="34" charset="-122"/>
+                <a:cs typeface="Arial" pitchFamily="34" charset="-120"/>
+              </a:rPr>
+              <a:t>Підтримувати</a:t>
+            </a:r>
+            <a:r>
+              <a:rPr lang="en-US" sz="1600" dirty="0">
+                <a:latin typeface="Arial" pitchFamily="34" charset="0"/>
+                <a:ea typeface="Arial" pitchFamily="34" charset="-122"/>
+                <a:cs typeface="Arial" pitchFamily="34" charset="-120"/>
+              </a:rPr>
+              <a:t> </a:t>
+            </a:r>
+            <a:r>
+              <a:rPr lang="uk-UA" sz="1600" dirty="0">
+                <a:latin typeface="Arial" pitchFamily="34" charset="0"/>
+                <a:ea typeface="Arial" pitchFamily="34" charset="-122"/>
+                <a:cs typeface="Arial" pitchFamily="34" charset="-120"/>
+              </a:rPr>
+              <a:t>малий та середній бізнес</a:t>
+            </a:r>
+            <a:r>
+              <a:rPr lang="en-US" sz="1600" dirty="0">
+                <a:latin typeface="Arial" pitchFamily="34" charset="0"/>
+                <a:ea typeface="Arial" pitchFamily="34" charset="-122"/>
+                <a:cs typeface="Arial" pitchFamily="34" charset="-120"/>
+              </a:rPr>
+              <a:t> в цифровій трансформації</a:t>
+            </a:r>
+            <a:endParaRPr lang="en-US" sz="1600" dirty="0"/>
           </a:p>
         </p:txBody>
       </p:sp>
@@ -15337,8 +15369,8 @@
         </p:nvSpPr>
         <p:spPr>
           <a:xfrm>
-            <a:off x="2341917" y="3713559"/>
-            <a:ext cx="4211973" cy="239911"/>
+            <a:off x="182880" y="3713559"/>
+            <a:ext cx="8193025" cy="411361"/>
           </a:xfrm>
           <a:prstGeom prst="rect">
             <a:avLst/>
@@ -15357,14 +15389,14 @@
               <a:buNone/>
             </a:pPr>
             <a:r>
-              <a:rPr lang="en-US" sz="1350" dirty="0">
+              <a:rPr lang="en-US" sz="1600" dirty="0">
                 <a:latin typeface="Arial" pitchFamily="34" charset="0"/>
                 <a:ea typeface="Arial" pitchFamily="34" charset="-122"/>
                 <a:cs typeface="Arial" pitchFamily="34" charset="-120"/>
               </a:rPr>
               <a:t>💡 Е-commerce = резилієнтність економіки</a:t>
             </a:r>
-            <a:endParaRPr lang="en-US" sz="1350" dirty="0"/>
+            <a:endParaRPr lang="en-US" sz="1600" dirty="0"/>
           </a:p>
         </p:txBody>
       </p:sp>
@@ -15994,12 +16026,23 @@
           <a:bodyPr wrap="square" lIns="0" tIns="0" rIns="0" bIns="0" rtlCol="0" anchor="t"/>
           <a:lstStyle/>
           <a:p>
-            <a:pPr marL="0" indent="0">
+            <a:pPr marL="0" indent="0" algn="ctr">
               <a:lnSpc>
                 <a:spcPts val="3240"/>
               </a:lnSpc>
               <a:buNone/>
             </a:pPr>
+            <a:r>
+              <a:rPr lang="uk-UA" sz="2700" b="1" dirty="0">
+                <a:solidFill>
+                  <a:srgbClr val="38BDF8"/>
+                </a:solidFill>
+                <a:latin typeface="Arial" pitchFamily="34" charset="0"/>
+                <a:ea typeface="Arial" pitchFamily="34" charset="-122"/>
+                <a:cs typeface="Arial" pitchFamily="34" charset="-120"/>
+              </a:rPr>
+              <a:t>Загальні</a:t>
+            </a:r>
             <a:r>
               <a:rPr lang="en-US" sz="2700" b="1" dirty="0">
                 <a:solidFill>
@@ -16009,7 +16052,7 @@
                 <a:ea typeface="Arial" pitchFamily="34" charset="-122"/>
                 <a:cs typeface="Arial" pitchFamily="34" charset="-120"/>
               </a:rPr>
-              <a:t>Ключові висновки</a:t>
+              <a:t> висновки</a:t>
             </a:r>
             <a:endParaRPr lang="en-US" sz="2700" dirty="0"/>
           </a:p>
@@ -16057,7 +16100,31 @@
                 <a:ea typeface="Arial" pitchFamily="34" charset="-122"/>
                 <a:cs typeface="Arial" pitchFamily="34" charset="-120"/>
               </a:rPr>
-              <a:t>стійка до криз</a:t>
+              <a:t>стійка </a:t>
+            </a:r>
+            <a:r>
+              <a:rPr lang="en-US" sz="1350" b="1" dirty="0" err="1">
+                <a:latin typeface="Arial" pitchFamily="34" charset="0"/>
+                <a:ea typeface="Arial" pitchFamily="34" charset="-122"/>
+                <a:cs typeface="Arial" pitchFamily="34" charset="-120"/>
+              </a:rPr>
+              <a:t>до</a:t>
+            </a:r>
+            <a:r>
+              <a:rPr lang="en-US" sz="1350" b="1" dirty="0">
+                <a:latin typeface="Arial" pitchFamily="34" charset="0"/>
+                <a:ea typeface="Arial" pitchFamily="34" charset="-122"/>
+                <a:cs typeface="Arial" pitchFamily="34" charset="-120"/>
+              </a:rPr>
+              <a:t> </a:t>
+            </a:r>
+            <a:r>
+              <a:rPr lang="uk-UA" sz="1350" b="1" dirty="0">
+                <a:latin typeface="Arial" pitchFamily="34" charset="0"/>
+                <a:ea typeface="Arial" pitchFamily="34" charset="-122"/>
+                <a:cs typeface="Arial" pitchFamily="34" charset="-120"/>
+              </a:rPr>
+              <a:t>шоків</a:t>
             </a:r>
             <a:r>
               <a:rPr lang="en-US" sz="1350" dirty="0">
@@ -16456,8 +16523,8 @@
         </p:nvSpPr>
         <p:spPr>
           <a:xfrm>
-            <a:off x="137886" y="1640507"/>
-            <a:ext cx="2910114" cy="1576983"/>
+            <a:off x="148190" y="1783258"/>
+            <a:ext cx="3151269" cy="1576983"/>
           </a:xfrm>
           <a:prstGeom prst="rect">
             <a:avLst/>
@@ -16482,9 +16549,8 @@
                 <a:ea typeface="Arial" pitchFamily="34" charset="-122"/>
                 <a:cs typeface="Arial" pitchFamily="34" charset="-120"/>
               </a:rPr>
-              <a:t>🦠 COVID-19: глобальне закриття 2020–2021</a:t>
-            </a:r>
-            <a:endParaRPr lang="en-US" sz="1350" dirty="0"/>
+              <a:t>🦠 COVID-19</a:t>
+            </a:r>
           </a:p>
           <a:p>
             <a:pPr marL="342900" indent="-342900">
@@ -16500,7 +16566,39 @@
                 <a:ea typeface="Arial" pitchFamily="34" charset="-122"/>
                 <a:cs typeface="Arial" pitchFamily="34" charset="-120"/>
               </a:rPr>
-              <a:t>⚔️ Конфлікт в Україні: </a:t>
+              <a:t>⚔️</a:t>
+            </a:r>
+            <a:r>
+              <a:rPr lang="uk-UA" sz="1350" dirty="0">
+                <a:latin typeface="Arial" pitchFamily="34" charset="0"/>
+                <a:ea typeface="Arial" pitchFamily="34" charset="-122"/>
+                <a:cs typeface="Arial" pitchFamily="34" charset="-120"/>
+              </a:rPr>
+              <a:t>Повномасштабна</a:t>
+            </a:r>
+            <a:r>
+              <a:rPr lang="en-US" sz="1350" dirty="0">
+                <a:latin typeface="Arial" pitchFamily="34" charset="0"/>
+                <a:ea typeface="Arial" pitchFamily="34" charset="-122"/>
+                <a:cs typeface="Arial" pitchFamily="34" charset="-120"/>
+              </a:rPr>
+              <a:t> </a:t>
+            </a:r>
+            <a:r>
+              <a:rPr lang="uk-UA" sz="1350" dirty="0">
+                <a:latin typeface="Arial" pitchFamily="34" charset="0"/>
+                <a:ea typeface="Arial" pitchFamily="34" charset="-122"/>
+                <a:cs typeface="Arial" pitchFamily="34" charset="-120"/>
+              </a:rPr>
+              <a:t>Війна</a:t>
+            </a:r>
+            <a:r>
+              <a:rPr lang="en-US" sz="1350" dirty="0">
+                <a:latin typeface="Arial" pitchFamily="34" charset="0"/>
+                <a:ea typeface="Arial" pitchFamily="34" charset="-122"/>
+                <a:cs typeface="Arial" pitchFamily="34" charset="-120"/>
+              </a:rPr>
+              <a:t> в </a:t>
             </a:r>
             <a:r>
               <a:rPr lang="en-US" sz="1350" dirty="0" err="1">
@@ -16508,14 +16606,44 @@
                 <a:ea typeface="Arial" pitchFamily="34" charset="-122"/>
                 <a:cs typeface="Arial" pitchFamily="34" charset="-120"/>
               </a:rPr>
-              <a:t>енергетична</a:t>
-            </a:r>
+              <a:t>Україні</a:t>
+            </a:r>
+            <a:endParaRPr lang="uk-UA" sz="1350" dirty="0">
+              <a:latin typeface="Arial" pitchFamily="34" charset="0"/>
+              <a:ea typeface="Arial" pitchFamily="34" charset="-122"/>
+              <a:cs typeface="Arial" pitchFamily="34" charset="-120"/>
+            </a:endParaRPr>
+          </a:p>
+          <a:p>
+            <a:pPr marL="342900" indent="-342900">
+              <a:lnSpc>
+                <a:spcPts val="2430"/>
+              </a:lnSpc>
+              <a:buSzPct val="100000"/>
+              <a:buChar char="•"/>
+            </a:pPr>
             <a:r>
               <a:rPr lang="uk-UA" sz="1350" dirty="0">
                 <a:latin typeface="Arial" pitchFamily="34" charset="0"/>
                 <a:ea typeface="Arial" pitchFamily="34" charset="-122"/>
                 <a:cs typeface="Arial" pitchFamily="34" charset="-120"/>
               </a:rPr>
+              <a:t>Е</a:t>
+            </a:r>
+            <a:r>
+              <a:rPr lang="en-US" sz="1350" dirty="0" err="1">
+                <a:latin typeface="Arial" pitchFamily="34" charset="0"/>
+                <a:ea typeface="Arial" pitchFamily="34" charset="-122"/>
+                <a:cs typeface="Arial" pitchFamily="34" charset="-120"/>
+              </a:rPr>
+              <a:t>нергетична</a:t>
+            </a:r>
+            <a:r>
+              <a:rPr lang="uk-UA" sz="1350" dirty="0">
+                <a:latin typeface="Arial" pitchFamily="34" charset="0"/>
+                <a:ea typeface="Arial" pitchFamily="34" charset="-122"/>
+                <a:cs typeface="Arial" pitchFamily="34" charset="-120"/>
+              </a:rPr>
               <a:t> та економічна</a:t>
             </a:r>
             <a:r>
@@ -16542,13 +16670,21 @@
               </a:rPr>
               <a:t>и</a:t>
             </a:r>
-            <a:r>
-              <a:rPr lang="en-US" sz="1350" dirty="0">
-                <a:latin typeface="Arial" pitchFamily="34" charset="0"/>
-                <a:ea typeface="Arial" pitchFamily="34" charset="-122"/>
-                <a:cs typeface="Arial" pitchFamily="34" charset="-120"/>
-              </a:rPr>
-              <a:t> 2022–2023</a:t>
+          </a:p>
+          <a:p>
+            <a:pPr marL="342900" indent="-342900">
+              <a:lnSpc>
+                <a:spcPts val="2430"/>
+              </a:lnSpc>
+              <a:buSzPct val="100000"/>
+              <a:buChar char="•"/>
+            </a:pPr>
+            <a:r>
+              <a:rPr lang="uk-UA" sz="1350" dirty="0">
+                <a:latin typeface="Arial" pitchFamily="34" charset="0"/>
+                <a:cs typeface="Arial" pitchFamily="34" charset="-120"/>
+              </a:rPr>
+              <a:t>Торгові війни</a:t>
             </a:r>
             <a:endParaRPr lang="en-US" sz="1350" dirty="0"/>
           </a:p>
@@ -16576,8 +16712,8 @@
         </p:blipFill>
         <p:spPr>
           <a:xfrm>
-            <a:off x="3048000" y="1785257"/>
-            <a:ext cx="6008915" cy="3358243"/>
+            <a:off x="3221591" y="1785257"/>
+            <a:ext cx="5850419" cy="3358243"/>
           </a:xfrm>
           <a:prstGeom prst="rect">
             <a:avLst/>
@@ -16598,8 +16734,8 @@
         </p:nvSpPr>
         <p:spPr>
           <a:xfrm>
-            <a:off x="87085" y="3108776"/>
-            <a:ext cx="2910114" cy="1914370"/>
+            <a:off x="0" y="3628390"/>
+            <a:ext cx="2910114" cy="1298817"/>
           </a:xfrm>
           <a:prstGeom prst="rect">
             <a:avLst/>
@@ -16612,12 +16748,11 @@
           </a:bodyPr>
           <a:lstStyle/>
           <a:p>
-            <a:pPr marL="342900" indent="-342900">
+            <a:pPr>
               <a:lnSpc>
                 <a:spcPts val="2430"/>
               </a:lnSpc>
               <a:buSzPct val="100000"/>
-              <a:buChar char="•"/>
             </a:pPr>
             <a:r>
               <a:rPr lang="en-US" sz="1800" dirty="0">
@@ -16644,12 +16779,100 @@
               <a:t>: </a:t>
             </a:r>
             <a:r>
-              <a:rPr lang="en-US" sz="1800" dirty="0" err="1">
-                <a:latin typeface="Arial" pitchFamily="34" charset="0"/>
-                <a:ea typeface="Arial" pitchFamily="34" charset="-122"/>
-                <a:cs typeface="Arial" pitchFamily="34" charset="-120"/>
-              </a:rPr>
-              <a:t>чи</a:t>
+              <a:rPr lang="ru-RU" sz="1800" dirty="0" err="1">
+                <a:latin typeface="Arial" pitchFamily="34" charset="0"/>
+                <a:ea typeface="Arial" pitchFamily="34" charset="-122"/>
+                <a:cs typeface="Arial" pitchFamily="34" charset="-120"/>
+              </a:rPr>
+              <a:t>Ч</a:t>
+            </a:r>
+            <a:r>
+              <a:rPr lang="ru-RU" dirty="0" err="1">
+                <a:latin typeface="Arial" pitchFamily="34" charset="0"/>
+                <a:ea typeface="Arial" pitchFamily="34" charset="-122"/>
+                <a:cs typeface="Arial" pitchFamily="34" charset="-120"/>
+              </a:rPr>
+              <a:t>и</a:t>
+            </a:r>
+            <a:r>
+              <a:rPr lang="ru-RU" dirty="0">
+                <a:latin typeface="Arial" pitchFamily="34" charset="0"/>
+                <a:ea typeface="Arial" pitchFamily="34" charset="-122"/>
+                <a:cs typeface="Arial" pitchFamily="34" charset="-120"/>
+              </a:rPr>
+              <a:t> </a:t>
+            </a:r>
+            <a:r>
+              <a:rPr lang="ru-RU" dirty="0" err="1">
+                <a:latin typeface="Arial" pitchFamily="34" charset="0"/>
+                <a:ea typeface="Arial" pitchFamily="34" charset="-122"/>
+                <a:cs typeface="Arial" pitchFamily="34" charset="-120"/>
+              </a:rPr>
+              <a:t>електронна</a:t>
+            </a:r>
+            <a:r>
+              <a:rPr lang="ru-RU" dirty="0">
+                <a:latin typeface="Arial" pitchFamily="34" charset="0"/>
+                <a:ea typeface="Arial" pitchFamily="34" charset="-122"/>
+                <a:cs typeface="Arial" pitchFamily="34" charset="-120"/>
+              </a:rPr>
+              <a:t> </a:t>
+            </a:r>
+            <a:r>
+              <a:rPr lang="ru-RU" dirty="0" err="1">
+                <a:latin typeface="Arial" pitchFamily="34" charset="0"/>
+                <a:ea typeface="Arial" pitchFamily="34" charset="-122"/>
+                <a:cs typeface="Arial" pitchFamily="34" charset="-120"/>
+              </a:rPr>
+              <a:t>комерція</a:t>
+            </a:r>
+            <a:r>
+              <a:rPr lang="ru-RU" dirty="0">
+                <a:latin typeface="Arial" pitchFamily="34" charset="0"/>
+                <a:ea typeface="Arial" pitchFamily="34" charset="-122"/>
+                <a:cs typeface="Arial" pitchFamily="34" charset="-120"/>
+              </a:rPr>
+              <a:t> є </a:t>
+            </a:r>
+            <a:r>
+              <a:rPr lang="ru-RU" dirty="0" err="1">
+                <a:latin typeface="Arial" pitchFamily="34" charset="0"/>
+                <a:ea typeface="Arial" pitchFamily="34" charset="-122"/>
+                <a:cs typeface="Arial" pitchFamily="34" charset="-120"/>
+              </a:rPr>
+              <a:t>стійкою</a:t>
+            </a:r>
+            <a:r>
+              <a:rPr lang="ru-RU" dirty="0">
+                <a:latin typeface="Arial" pitchFamily="34" charset="0"/>
+                <a:ea typeface="Arial" pitchFamily="34" charset="-122"/>
+                <a:cs typeface="Arial" pitchFamily="34" charset="-120"/>
+              </a:rPr>
+              <a:t> до таких </a:t>
+            </a:r>
+            <a:r>
+              <a:rPr lang="ru-RU" dirty="0" err="1">
+                <a:latin typeface="Arial" pitchFamily="34" charset="0"/>
+                <a:ea typeface="Arial" pitchFamily="34" charset="-122"/>
+                <a:cs typeface="Arial" pitchFamily="34" charset="-120"/>
+              </a:rPr>
+              <a:t>глобальних</a:t>
+            </a:r>
+            <a:r>
+              <a:rPr lang="ru-RU" dirty="0">
+                <a:latin typeface="Arial" pitchFamily="34" charset="0"/>
+                <a:ea typeface="Arial" pitchFamily="34" charset="-122"/>
+                <a:cs typeface="Arial" pitchFamily="34" charset="-120"/>
+              </a:rPr>
+              <a:t> </a:t>
+            </a:r>
+            <a:r>
+              <a:rPr lang="ru-RU" dirty="0" err="1">
+                <a:latin typeface="Arial" pitchFamily="34" charset="0"/>
+                <a:ea typeface="Arial" pitchFamily="34" charset="-122"/>
+                <a:cs typeface="Arial" pitchFamily="34" charset="-120"/>
+              </a:rPr>
+              <a:t>шоків</a:t>
             </a:r>
             <a:r>
               <a:rPr lang="en-US" sz="1800" dirty="0">
@@ -16657,145 +16880,7 @@
                 <a:ea typeface="Arial" pitchFamily="34" charset="-122"/>
                 <a:cs typeface="Arial" pitchFamily="34" charset="-120"/>
               </a:rPr>
-              <a:t> e-commerce </a:t>
-            </a:r>
-            <a:r>
-              <a:rPr lang="en-US" sz="1800" dirty="0" err="1">
-                <a:latin typeface="Arial" pitchFamily="34" charset="0"/>
-                <a:ea typeface="Arial" pitchFamily="34" charset="-122"/>
-                <a:cs typeface="Arial" pitchFamily="34" charset="-120"/>
-              </a:rPr>
-              <a:t>показує</a:t>
-            </a:r>
-            <a:r>
-              <a:rPr lang="en-US" sz="1800" dirty="0">
-                <a:latin typeface="Arial" pitchFamily="34" charset="0"/>
-                <a:ea typeface="Arial" pitchFamily="34" charset="-122"/>
-                <a:cs typeface="Arial" pitchFamily="34" charset="-120"/>
-              </a:rPr>
-              <a:t> </a:t>
-            </a:r>
-            <a:r>
-              <a:rPr lang="en-US" sz="1800" dirty="0" err="1">
-                <a:latin typeface="Arial" pitchFamily="34" charset="0"/>
-                <a:ea typeface="Arial" pitchFamily="34" charset="-122"/>
-                <a:cs typeface="Arial" pitchFamily="34" charset="-120"/>
-              </a:rPr>
-              <a:t>стійкість</a:t>
-            </a:r>
-            <a:r>
-              <a:rPr lang="en-US" sz="1800" dirty="0">
-                <a:latin typeface="Arial" pitchFamily="34" charset="0"/>
-                <a:ea typeface="Arial" pitchFamily="34" charset="-122"/>
-                <a:cs typeface="Arial" pitchFamily="34" charset="-120"/>
-              </a:rPr>
               <a:t>?</a:t>
-            </a:r>
-            <a:endParaRPr lang="en-US" sz="1800" dirty="0"/>
-          </a:p>
-          <a:p>
-            <a:pPr marL="342900" indent="-342900">
-              <a:lnSpc>
-                <a:spcPts val="2430"/>
-              </a:lnSpc>
-              <a:buSzPct val="100000"/>
-              <a:buChar char="•"/>
-            </a:pPr>
-            <a:r>
-              <a:rPr lang="en-US" sz="1800" dirty="0">
-                <a:latin typeface="Arial" pitchFamily="34" charset="0"/>
-                <a:ea typeface="Arial" pitchFamily="34" charset="-122"/>
-                <a:cs typeface="Arial" pitchFamily="34" charset="-120"/>
-              </a:rPr>
-              <a:t>🌐 </a:t>
-            </a:r>
-            <a:r>
-              <a:rPr lang="en-US" sz="1800" dirty="0" err="1">
-                <a:latin typeface="Arial" pitchFamily="34" charset="0"/>
-                <a:ea typeface="Arial" pitchFamily="34" charset="-122"/>
-                <a:cs typeface="Arial" pitchFamily="34" charset="-120"/>
-              </a:rPr>
-              <a:t>Роль</a:t>
-            </a:r>
-            <a:r>
-              <a:rPr lang="en-US" sz="1800" dirty="0">
-                <a:latin typeface="Arial" pitchFamily="34" charset="0"/>
-                <a:ea typeface="Arial" pitchFamily="34" charset="-122"/>
-                <a:cs typeface="Arial" pitchFamily="34" charset="-120"/>
-              </a:rPr>
-              <a:t> </a:t>
-            </a:r>
-            <a:r>
-              <a:rPr lang="en-US" sz="1800" dirty="0" err="1">
-                <a:latin typeface="Arial" pitchFamily="34" charset="0"/>
-                <a:ea typeface="Arial" pitchFamily="34" charset="-122"/>
-                <a:cs typeface="Arial" pitchFamily="34" charset="-120"/>
-              </a:rPr>
-              <a:t>цифрової</a:t>
-            </a:r>
-            <a:r>
-              <a:rPr lang="en-US" sz="1800" dirty="0">
-                <a:latin typeface="Arial" pitchFamily="34" charset="0"/>
-                <a:ea typeface="Arial" pitchFamily="34" charset="-122"/>
-                <a:cs typeface="Arial" pitchFamily="34" charset="-120"/>
-              </a:rPr>
-              <a:t> </a:t>
-            </a:r>
-            <a:r>
-              <a:rPr lang="en-US" sz="1800" dirty="0" err="1">
-                <a:latin typeface="Arial" pitchFamily="34" charset="0"/>
-                <a:ea typeface="Arial" pitchFamily="34" charset="-122"/>
-                <a:cs typeface="Arial" pitchFamily="34" charset="-120"/>
-              </a:rPr>
-              <a:t>інфраструктури</a:t>
-            </a:r>
-            <a:r>
-              <a:rPr lang="en-US" sz="1800" dirty="0">
-                <a:latin typeface="Arial" pitchFamily="34" charset="0"/>
-                <a:ea typeface="Arial" pitchFamily="34" charset="-122"/>
-                <a:cs typeface="Arial" pitchFamily="34" charset="-120"/>
-              </a:rPr>
-              <a:t> </a:t>
-            </a:r>
-            <a:r>
-              <a:rPr lang="en-US" sz="1800" dirty="0" err="1">
-                <a:latin typeface="Arial" pitchFamily="34" charset="0"/>
-                <a:ea typeface="Arial" pitchFamily="34" charset="-122"/>
-                <a:cs typeface="Arial" pitchFamily="34" charset="-120"/>
-              </a:rPr>
-              <a:t>як</a:t>
-            </a:r>
-            <a:r>
-              <a:rPr lang="en-US" sz="1800" dirty="0">
-                <a:latin typeface="Arial" pitchFamily="34" charset="0"/>
-                <a:ea typeface="Arial" pitchFamily="34" charset="-122"/>
-                <a:cs typeface="Arial" pitchFamily="34" charset="-120"/>
-              </a:rPr>
-              <a:t> </a:t>
-            </a:r>
-            <a:r>
-              <a:rPr lang="en-US" sz="1800" dirty="0" err="1">
-                <a:latin typeface="Arial" pitchFamily="34" charset="0"/>
-                <a:ea typeface="Arial" pitchFamily="34" charset="-122"/>
-                <a:cs typeface="Arial" pitchFamily="34" charset="-120"/>
-              </a:rPr>
-              <a:t>ключового</a:t>
-            </a:r>
-            <a:r>
-              <a:rPr lang="en-US" sz="1800" dirty="0">
-                <a:latin typeface="Arial" pitchFamily="34" charset="0"/>
-                <a:ea typeface="Arial" pitchFamily="34" charset="-122"/>
-                <a:cs typeface="Arial" pitchFamily="34" charset="-120"/>
-              </a:rPr>
-              <a:t> </a:t>
-            </a:r>
-            <a:r>
-              <a:rPr lang="en-US" sz="1800" dirty="0" err="1">
-                <a:latin typeface="Arial" pitchFamily="34" charset="0"/>
-                <a:ea typeface="Arial" pitchFamily="34" charset="-122"/>
-                <a:cs typeface="Arial" pitchFamily="34" charset="-120"/>
-              </a:rPr>
-              <a:t>фактору</a:t>
             </a:r>
             <a:endParaRPr lang="en-US" sz="1800" dirty="0"/>
           </a:p>
@@ -16847,24 +16932,96 @@
           <a:bodyPr wrap="square" lIns="0" tIns="0" rIns="0" bIns="0" rtlCol="0" anchor="t"/>
           <a:lstStyle/>
           <a:p>
-            <a:pPr marL="0" indent="0">
+            <a:pPr algn="ctr">
               <a:lnSpc>
                 <a:spcPts val="3240"/>
               </a:lnSpc>
-              <a:buNone/>
             </a:pPr>
             <a:r>
-              <a:rPr lang="en-US" sz="2700" b="1" dirty="0">
+              <a:rPr lang="ru-RU" sz="2700" dirty="0" err="1">
                 <a:solidFill>
-                  <a:srgbClr val="38BDF8"/>
+                  <a:srgbClr val="00B0F0"/>
                 </a:solidFill>
-                <a:latin typeface="Arial" pitchFamily="34" charset="0"/>
-                <a:ea typeface="Arial" pitchFamily="34" charset="-122"/>
-                <a:cs typeface="Arial" pitchFamily="34" charset="-120"/>
-              </a:rPr>
-              <a:t>Дослідницькі питання | Research Questions</a:t>
-            </a:r>
-            <a:endParaRPr lang="en-US" sz="2700" dirty="0"/>
+              </a:rPr>
+              <a:t>Дослідження</a:t>
+            </a:r>
+            <a:r>
+              <a:rPr lang="ru-RU" sz="2700" dirty="0">
+                <a:solidFill>
+                  <a:srgbClr val="00B0F0"/>
+                </a:solidFill>
+              </a:rPr>
+              <a:t> </a:t>
+            </a:r>
+            <a:r>
+              <a:rPr lang="ru-RU" sz="2700" dirty="0" err="1">
+                <a:solidFill>
+                  <a:srgbClr val="00B0F0"/>
+                </a:solidFill>
+              </a:rPr>
+              <a:t>базується</a:t>
+            </a:r>
+            <a:r>
+              <a:rPr lang="ru-RU" sz="2700" dirty="0">
+                <a:solidFill>
+                  <a:srgbClr val="00B0F0"/>
+                </a:solidFill>
+              </a:rPr>
+              <a:t> на </a:t>
+            </a:r>
+            <a:r>
+              <a:rPr lang="ru-RU" sz="2700" dirty="0" err="1">
+                <a:solidFill>
+                  <a:srgbClr val="00B0F0"/>
+                </a:solidFill>
+              </a:rPr>
+              <a:t>трьох</a:t>
+            </a:r>
+            <a:r>
+              <a:rPr lang="ru-RU" sz="2700" dirty="0">
+                <a:solidFill>
+                  <a:srgbClr val="00B0F0"/>
+                </a:solidFill>
+              </a:rPr>
+              <a:t> </a:t>
+            </a:r>
+            <a:r>
+              <a:rPr lang="ru-RU" sz="2700" dirty="0" err="1">
+                <a:solidFill>
+                  <a:srgbClr val="00B0F0"/>
+                </a:solidFill>
+              </a:rPr>
+              <a:t>ключових</a:t>
+            </a:r>
+            <a:r>
+              <a:rPr lang="ru-RU" sz="2700" dirty="0">
+                <a:solidFill>
+                  <a:srgbClr val="00B0F0"/>
+                </a:solidFill>
+              </a:rPr>
+              <a:t> </a:t>
+            </a:r>
+            <a:r>
+              <a:rPr lang="ru-RU" sz="2700" dirty="0" err="1">
+                <a:solidFill>
+                  <a:srgbClr val="00B0F0"/>
+                </a:solidFill>
+              </a:rPr>
+              <a:t>питаннях</a:t>
+            </a:r>
+            <a:r>
+              <a:rPr lang="ru-RU" sz="2700" dirty="0">
+                <a:solidFill>
+                  <a:srgbClr val="00B0F0"/>
+                </a:solidFill>
+              </a:rPr>
+              <a:t>:</a:t>
+            </a:r>
+            <a:endParaRPr lang="en-US" sz="2700" dirty="0">
+              <a:solidFill>
+                <a:srgbClr val="00B0F0"/>
+              </a:solidFill>
+            </a:endParaRPr>
           </a:p>
         </p:txBody>
       </p:sp>
@@ -16877,7 +17034,7 @@
         <p:spPr>
           <a:xfrm>
             <a:off x="609600" y="2217435"/>
-            <a:ext cx="7620000" cy="1325761"/>
+            <a:ext cx="7620000" cy="611109"/>
           </a:xfrm>
           <a:prstGeom prst="rect">
             <a:avLst/>
@@ -16896,131 +17053,46 @@
               <a:buSzPct val="100000"/>
               <a:buChar char="•"/>
             </a:pPr>
-            <a:r>
-              <a:rPr lang="en-US" sz="1200" dirty="0">
-                <a:solidFill>
-                  <a:srgbClr val="CBD5E1"/>
-                </a:solidFill>
-                <a:latin typeface="Arial" pitchFamily="34" charset="0"/>
-                <a:ea typeface="Arial" pitchFamily="34" charset="-122"/>
-                <a:cs typeface="Arial" pitchFamily="34" charset="-120"/>
-              </a:rPr>
-              <a:t>❓ </a:t>
-            </a:r>
-            <a:r>
-              <a:rPr lang="en-US" sz="1200" b="1" dirty="0">
-                <a:solidFill>
-                  <a:srgbClr val="38BDF8"/>
-                </a:solidFill>
-                <a:latin typeface="Arial" pitchFamily="34" charset="0"/>
-                <a:ea typeface="Arial" pitchFamily="34" charset="-122"/>
-                <a:cs typeface="Arial" pitchFamily="34" charset="-120"/>
-              </a:rPr>
-              <a:t>RQ1:</a:t>
-            </a:r>
-            <a:r>
-              <a:rPr lang="en-US" sz="1200" dirty="0">
-                <a:solidFill>
-                  <a:srgbClr val="CBD5E1"/>
-                </a:solidFill>
-                <a:latin typeface="Arial" pitchFamily="34" charset="0"/>
-                <a:ea typeface="Arial" pitchFamily="34" charset="-122"/>
-                <a:cs typeface="Arial" pitchFamily="34" charset="-120"/>
-              </a:rPr>
-              <a:t> </a:t>
-            </a:r>
-            <a:r>
-              <a:rPr lang="en-US" sz="1200" dirty="0">
-                <a:latin typeface="Arial" pitchFamily="34" charset="0"/>
-                <a:ea typeface="Arial" pitchFamily="34" charset="-122"/>
-                <a:cs typeface="Arial" pitchFamily="34" charset="-120"/>
-              </a:rPr>
-              <a:t>Чим відрізняються розвинені й розвивальні економіки за динамікою e‑commerce у періоди </a:t>
-            </a:r>
-            <a:r>
-              <a:rPr lang="en-US" sz="1200" dirty="0" err="1">
-                <a:latin typeface="Arial" pitchFamily="34" charset="0"/>
-                <a:ea typeface="Arial" pitchFamily="34" charset="-122"/>
-                <a:cs typeface="Arial" pitchFamily="34" charset="-120"/>
-              </a:rPr>
-              <a:t>шоків</a:t>
-            </a:r>
-            <a:r>
-              <a:rPr lang="en-US" sz="1200" dirty="0">
-                <a:latin typeface="Arial" pitchFamily="34" charset="0"/>
-                <a:ea typeface="Arial" pitchFamily="34" charset="-122"/>
-                <a:cs typeface="Arial" pitchFamily="34" charset="-120"/>
-              </a:rPr>
-              <a:t>?</a:t>
-            </a:r>
-            <a:r>
-              <a:rPr lang="ru-RU" sz="1200" dirty="0">
-                <a:latin typeface="Arial" pitchFamily="34" charset="0"/>
-                <a:ea typeface="Arial" pitchFamily="34" charset="-122"/>
-                <a:cs typeface="Arial" pitchFamily="34" charset="-120"/>
-              </a:rPr>
-              <a:t> </a:t>
-            </a:r>
-            <a:r>
-              <a:rPr lang="ru-RU" sz="1200" dirty="0" err="1">
-                <a:latin typeface="Arial" pitchFamily="34" charset="0"/>
-                <a:ea typeface="Arial" pitchFamily="34" charset="-122"/>
-                <a:cs typeface="Arial" pitchFamily="34" charset="-120"/>
-              </a:rPr>
-              <a:t>Чи</a:t>
-            </a:r>
-            <a:r>
-              <a:rPr lang="ru-RU" sz="1200" dirty="0">
-                <a:latin typeface="Arial" pitchFamily="34" charset="0"/>
-                <a:ea typeface="Arial" pitchFamily="34" charset="-122"/>
-                <a:cs typeface="Arial" pitchFamily="34" charset="-120"/>
-              </a:rPr>
-              <a:t> </a:t>
-            </a:r>
-            <a:r>
-              <a:rPr lang="ru-RU" sz="1200" dirty="0" err="1">
-                <a:latin typeface="Arial" pitchFamily="34" charset="0"/>
-                <a:ea typeface="Arial" pitchFamily="34" charset="-122"/>
-                <a:cs typeface="Arial" pitchFamily="34" charset="-120"/>
-              </a:rPr>
-              <a:t>однаково</a:t>
-            </a:r>
-            <a:r>
-              <a:rPr lang="ru-RU" sz="1200" dirty="0">
-                <a:latin typeface="Arial" pitchFamily="34" charset="0"/>
-                <a:ea typeface="Arial" pitchFamily="34" charset="-122"/>
-                <a:cs typeface="Arial" pitchFamily="34" charset="-120"/>
-              </a:rPr>
-              <a:t> вони </a:t>
-            </a:r>
-            <a:r>
-              <a:rPr lang="ru-RU" sz="1200" dirty="0" err="1">
-                <a:latin typeface="Arial" pitchFamily="34" charset="0"/>
-                <a:ea typeface="Arial" pitchFamily="34" charset="-122"/>
-                <a:cs typeface="Arial" pitchFamily="34" charset="-120"/>
-              </a:rPr>
-              <a:t>реагують</a:t>
-            </a:r>
-            <a:r>
-              <a:rPr lang="ru-RU" sz="1200" dirty="0">
-                <a:latin typeface="Arial" pitchFamily="34" charset="0"/>
-                <a:ea typeface="Arial" pitchFamily="34" charset="-122"/>
-                <a:cs typeface="Arial" pitchFamily="34" charset="-120"/>
-              </a:rPr>
-              <a:t> на шоки? </a:t>
-            </a:r>
-            <a:endParaRPr lang="en-US" sz="1200" dirty="0"/>
-          </a:p>
-          <a:p>
-            <a:pPr marL="342900" indent="-342900">
+            <a:endParaRPr lang="en-US" sz="1400" dirty="0"/>
+          </a:p>
+        </p:txBody>
+      </p:sp>
+      <p:sp>
+        <p:nvSpPr>
+          <p:cNvPr id="5" name="TextBox 4">
+            <a:extLst>
+              <a:ext uri="{FF2B5EF4-FFF2-40B4-BE49-F238E27FC236}">
+                <a16:creationId xmlns:a16="http://schemas.microsoft.com/office/drawing/2014/main" id="{5A679C6E-EAFC-004F-A1EB-9DA23A8EEA63}"/>
+              </a:ext>
+            </a:extLst>
+          </p:cNvPr>
+          <p:cNvSpPr txBox="1"/>
+          <p:nvPr/>
+        </p:nvSpPr>
+        <p:spPr>
+          <a:xfrm>
+            <a:off x="4364736" y="3966423"/>
+            <a:ext cx="3864864" cy="920508"/>
+          </a:xfrm>
+          <a:prstGeom prst="rect">
+            <a:avLst/>
+          </a:prstGeom>
+          <a:noFill/>
+        </p:spPr>
+        <p:txBody>
+          <a:bodyPr wrap="square">
+            <a:spAutoFit/>
+          </a:bodyPr>
+          <a:lstStyle/>
+          <a:p>
+            <a:pPr>
               <a:lnSpc>
                 <a:spcPts val="2160"/>
               </a:lnSpc>
               <a:buSzPct val="100000"/>
-              <a:buChar char="•"/>
             </a:pPr>
             <a:r>
-              <a:rPr lang="en-US" sz="1200" dirty="0">
+              <a:rPr lang="en-US" sz="1600" dirty="0">
                 <a:solidFill>
                   <a:srgbClr val="CBD5E1"/>
                 </a:solidFill>
@@ -17031,7 +17103,7 @@
               <a:t>❓ </a:t>
             </a:r>
             <a:r>
-              <a:rPr lang="en-US" sz="1200" b="1" dirty="0">
+              <a:rPr lang="uk-UA" sz="1600" b="1" dirty="0">
                 <a:solidFill>
                   <a:srgbClr val="38BDF8"/>
                 </a:solidFill>
@@ -17039,10 +17111,21 @@
                 <a:ea typeface="Arial" pitchFamily="34" charset="-122"/>
                 <a:cs typeface="Arial" pitchFamily="34" charset="-120"/>
               </a:rPr>
-              <a:t>RQ2:</a:t>
-            </a:r>
-            <a:r>
-              <a:rPr lang="en-US" sz="1200" dirty="0">
+              <a:t>Третє</a:t>
+            </a:r>
+            <a:r>
+              <a:rPr lang="en-US" sz="1600" b="1" dirty="0">
+                <a:solidFill>
+                  <a:srgbClr val="38BDF8"/>
+                </a:solidFill>
+                <a:latin typeface="Arial" pitchFamily="34" charset="0"/>
+                <a:ea typeface="Arial" pitchFamily="34" charset="-122"/>
+                <a:cs typeface="Arial" pitchFamily="34" charset="-120"/>
+              </a:rPr>
+              <a:t>:</a:t>
+            </a:r>
+            <a:r>
+              <a:rPr lang="en-US" sz="1600" dirty="0">
                 <a:solidFill>
                   <a:srgbClr val="CBD5E1"/>
                 </a:solidFill>
@@ -17053,23 +17136,15 @@
               <a:t> </a:t>
             </a:r>
             <a:r>
-              <a:rPr lang="en-US" sz="1200" dirty="0">
-                <a:latin typeface="Arial" pitchFamily="34" charset="0"/>
-                <a:ea typeface="Arial" pitchFamily="34" charset="-122"/>
-                <a:cs typeface="Arial" pitchFamily="34" charset="-120"/>
-              </a:rPr>
-              <a:t>Які структурні характеристики (цифрова інфраструктура, доходи, фінансова інклюзія, якість регуляції) пов'язані з </a:t>
-            </a:r>
-            <a:r>
-              <a:rPr lang="en-US" sz="1200" dirty="0" err="1">
-                <a:latin typeface="Arial" pitchFamily="34" charset="0"/>
-                <a:ea typeface="Arial" pitchFamily="34" charset="-122"/>
-                <a:cs typeface="Arial" pitchFamily="34" charset="-120"/>
-              </a:rPr>
-              <a:t>більшою</a:t>
-            </a:r>
-            <a:r>
-              <a:rPr lang="en-US" sz="1200" dirty="0">
+              <a:rPr lang="en-US" sz="1600" dirty="0" err="1">
+                <a:latin typeface="Arial" pitchFamily="34" charset="0"/>
+                <a:ea typeface="Arial" pitchFamily="34" charset="-122"/>
+                <a:cs typeface="Arial" pitchFamily="34" charset="-120"/>
+              </a:rPr>
+              <a:t>Чи</a:t>
+            </a:r>
+            <a:r>
+              <a:rPr lang="en-US" sz="1600" dirty="0">
                 <a:latin typeface="Arial" pitchFamily="34" charset="0"/>
                 <a:ea typeface="Arial" pitchFamily="34" charset="-122"/>
                 <a:cs typeface="Arial" pitchFamily="34" charset="-120"/>
@@ -17077,15 +17152,15 @@
               <a:t> </a:t>
             </a:r>
             <a:r>
-              <a:rPr lang="en-US" sz="1200" dirty="0" err="1">
-                <a:latin typeface="Arial" pitchFamily="34" charset="0"/>
-                <a:ea typeface="Arial" pitchFamily="34" charset="-122"/>
-                <a:cs typeface="Arial" pitchFamily="34" charset="-120"/>
-              </a:rPr>
-              <a:t>стійкістю</a:t>
-            </a:r>
-            <a:r>
-              <a:rPr lang="uk-UA" sz="1200" dirty="0">
+              <a:rPr lang="en-US" sz="1600" dirty="0" err="1">
+                <a:latin typeface="Arial" pitchFamily="34" charset="0"/>
+                <a:ea typeface="Arial" pitchFamily="34" charset="-122"/>
+                <a:cs typeface="Arial" pitchFamily="34" charset="-120"/>
+              </a:rPr>
+              <a:t>відрізняється</a:t>
+            </a:r>
+            <a:r>
+              <a:rPr lang="en-US" sz="1600" dirty="0">
                 <a:latin typeface="Arial" pitchFamily="34" charset="0"/>
                 <a:ea typeface="Arial" pitchFamily="34" charset="-122"/>
                 <a:cs typeface="Arial" pitchFamily="34" charset="-120"/>
@@ -17093,25 +17168,141 @@
               <a:t> </a:t>
             </a:r>
             <a:r>
-              <a:rPr lang="en-US" sz="1200" dirty="0">
-                <a:latin typeface="Arial" pitchFamily="34" charset="0"/>
-                <a:ea typeface="Arial" pitchFamily="34" charset="-122"/>
-                <a:cs typeface="Arial" pitchFamily="34" charset="-120"/>
-              </a:rPr>
-              <a:t>e-commerce?</a:t>
-            </a:r>
-            <a:endParaRPr lang="en-US" sz="1200" dirty="0"/>
-          </a:p>
-          <a:p>
-            <a:pPr marL="342900" indent="-342900">
+              <a:rPr lang="en-US" sz="1600" dirty="0" err="1">
+                <a:latin typeface="Arial" pitchFamily="34" charset="0"/>
+                <a:ea typeface="Arial" pitchFamily="34" charset="-122"/>
+                <a:cs typeface="Arial" pitchFamily="34" charset="-120"/>
+              </a:rPr>
+              <a:t>динаміка</a:t>
+            </a:r>
+            <a:r>
+              <a:rPr lang="en-US" sz="1600" dirty="0">
+                <a:latin typeface="Arial" pitchFamily="34" charset="0"/>
+                <a:ea typeface="Arial" pitchFamily="34" charset="-122"/>
+                <a:cs typeface="Arial" pitchFamily="34" charset="-120"/>
+              </a:rPr>
+              <a:t> e‑commerce у </a:t>
+            </a:r>
+            <a:r>
+              <a:rPr lang="en-US" sz="1600" dirty="0" err="1">
+                <a:latin typeface="Arial" pitchFamily="34" charset="0"/>
+                <a:ea typeface="Arial" pitchFamily="34" charset="-122"/>
+                <a:cs typeface="Arial" pitchFamily="34" charset="-120"/>
+              </a:rPr>
+              <a:t>країнах</a:t>
+            </a:r>
+            <a:r>
+              <a:rPr lang="en-US" sz="1600" dirty="0">
+                <a:latin typeface="Arial" pitchFamily="34" charset="0"/>
+                <a:ea typeface="Arial" pitchFamily="34" charset="-122"/>
+                <a:cs typeface="Arial" pitchFamily="34" charset="-120"/>
+              </a:rPr>
+              <a:t> з </a:t>
+            </a:r>
+            <a:r>
+              <a:rPr lang="en-US" sz="1600" dirty="0" err="1">
+                <a:latin typeface="Arial" pitchFamily="34" charset="0"/>
+                <a:ea typeface="Arial" pitchFamily="34" charset="-122"/>
+                <a:cs typeface="Arial" pitchFamily="34" charset="-120"/>
+              </a:rPr>
+              <a:t>конфліктами</a:t>
+            </a:r>
+            <a:r>
+              <a:rPr lang="en-US" sz="1600" dirty="0">
+                <a:latin typeface="Arial" pitchFamily="34" charset="0"/>
+                <a:ea typeface="Arial" pitchFamily="34" charset="-122"/>
+                <a:cs typeface="Arial" pitchFamily="34" charset="-120"/>
+              </a:rPr>
+              <a:t> </a:t>
+            </a:r>
+            <a:r>
+              <a:rPr lang="en-US" sz="1600" dirty="0" err="1">
+                <a:latin typeface="Arial" pitchFamily="34" charset="0"/>
+                <a:ea typeface="Arial" pitchFamily="34" charset="-122"/>
+                <a:cs typeface="Arial" pitchFamily="34" charset="-120"/>
+              </a:rPr>
+              <a:t>порівняно</a:t>
+            </a:r>
+            <a:r>
+              <a:rPr lang="en-US" sz="1600" dirty="0">
+                <a:latin typeface="Arial" pitchFamily="34" charset="0"/>
+                <a:ea typeface="Arial" pitchFamily="34" charset="-122"/>
+                <a:cs typeface="Arial" pitchFamily="34" charset="-120"/>
+              </a:rPr>
+              <a:t> з </a:t>
+            </a:r>
+            <a:r>
+              <a:rPr lang="en-US" sz="1600" dirty="0" err="1">
+                <a:latin typeface="Arial" pitchFamily="34" charset="0"/>
+                <a:ea typeface="Arial" pitchFamily="34" charset="-122"/>
+                <a:cs typeface="Arial" pitchFamily="34" charset="-120"/>
+              </a:rPr>
+              <a:t>мирними</a:t>
+            </a:r>
+            <a:r>
+              <a:rPr lang="en-US" sz="1600" dirty="0">
+                <a:latin typeface="Arial" pitchFamily="34" charset="0"/>
+                <a:ea typeface="Arial" pitchFamily="34" charset="-122"/>
+                <a:cs typeface="Arial" pitchFamily="34" charset="-120"/>
+              </a:rPr>
+              <a:t> </a:t>
+            </a:r>
+            <a:r>
+              <a:rPr lang="en-US" sz="1600" dirty="0" err="1">
+                <a:latin typeface="Arial" pitchFamily="34" charset="0"/>
+                <a:ea typeface="Arial" pitchFamily="34" charset="-122"/>
+                <a:cs typeface="Arial" pitchFamily="34" charset="-120"/>
+              </a:rPr>
+              <a:t>країнами</a:t>
+            </a:r>
+            <a:r>
+              <a:rPr lang="en-US" sz="1600" dirty="0">
+                <a:latin typeface="Arial" pitchFamily="34" charset="0"/>
+                <a:ea typeface="Arial" pitchFamily="34" charset="-122"/>
+                <a:cs typeface="Arial" pitchFamily="34" charset="-120"/>
+              </a:rPr>
+              <a:t>?</a:t>
+            </a:r>
+            <a:endParaRPr lang="en-US" sz="1600" dirty="0"/>
+          </a:p>
+        </p:txBody>
+      </p:sp>
+      <p:sp>
+        <p:nvSpPr>
+          <p:cNvPr id="7" name="TextBox 6">
+            <a:extLst>
+              <a:ext uri="{FF2B5EF4-FFF2-40B4-BE49-F238E27FC236}">
+                <a16:creationId xmlns:a16="http://schemas.microsoft.com/office/drawing/2014/main" id="{1E6759AD-050F-3334-12C8-8C914FE47E01}"/>
+              </a:ext>
+            </a:extLst>
+          </p:cNvPr>
+          <p:cNvSpPr txBox="1"/>
+          <p:nvPr/>
+        </p:nvSpPr>
+        <p:spPr>
+          <a:xfrm>
+            <a:off x="195072" y="2769621"/>
+            <a:ext cx="3718560" cy="1478931"/>
+          </a:xfrm>
+          <a:prstGeom prst="rect">
+            <a:avLst/>
+          </a:prstGeom>
+          <a:noFill/>
+        </p:spPr>
+        <p:txBody>
+          <a:bodyPr wrap="square">
+            <a:spAutoFit/>
+          </a:bodyPr>
+          <a:lstStyle/>
+          <a:p>
+            <a:pPr>
               <a:lnSpc>
                 <a:spcPts val="2160"/>
               </a:lnSpc>
               <a:buSzPct val="100000"/>
-              <a:buChar char="•"/>
             </a:pPr>
             <a:r>
-              <a:rPr lang="en-US" sz="1200" dirty="0">
+              <a:rPr lang="en-US" sz="1600" dirty="0">
                 <a:solidFill>
                   <a:srgbClr val="CBD5E1"/>
                 </a:solidFill>
@@ -17122,7 +17313,7 @@
               <a:t>❓ </a:t>
             </a:r>
             <a:r>
-              <a:rPr lang="en-US" sz="1200" b="1" dirty="0">
+              <a:rPr lang="uk-UA" sz="1600" b="1" dirty="0">
                 <a:solidFill>
                   <a:srgbClr val="38BDF8"/>
                 </a:solidFill>
@@ -17130,10 +17321,21 @@
                 <a:ea typeface="Arial" pitchFamily="34" charset="-122"/>
                 <a:cs typeface="Arial" pitchFamily="34" charset="-120"/>
               </a:rPr>
-              <a:t>RQ3:</a:t>
-            </a:r>
-            <a:r>
-              <a:rPr lang="en-US" sz="1200" dirty="0">
+              <a:t>Друге</a:t>
+            </a:r>
+            <a:r>
+              <a:rPr lang="en-US" sz="1600" b="1" dirty="0">
+                <a:solidFill>
+                  <a:srgbClr val="38BDF8"/>
+                </a:solidFill>
+                <a:latin typeface="Arial" pitchFamily="34" charset="0"/>
+                <a:ea typeface="Arial" pitchFamily="34" charset="-122"/>
+                <a:cs typeface="Arial" pitchFamily="34" charset="-120"/>
+              </a:rPr>
+              <a:t>:</a:t>
+            </a:r>
+            <a:r>
+              <a:rPr lang="en-US" sz="1600" dirty="0">
                 <a:solidFill>
                   <a:srgbClr val="CBD5E1"/>
                 </a:solidFill>
@@ -17144,14 +17346,504 @@
               <a:t> </a:t>
             </a:r>
             <a:r>
-              <a:rPr lang="en-US" sz="1200" dirty="0">
-                <a:latin typeface="Arial" pitchFamily="34" charset="0"/>
-                <a:ea typeface="Arial" pitchFamily="34" charset="-122"/>
-                <a:cs typeface="Arial" pitchFamily="34" charset="-120"/>
-              </a:rPr>
-              <a:t>Чи відрізняється динаміка e‑commerce у країнах з конфліктами порівняно з мирними країнами?</a:t>
-            </a:r>
-            <a:endParaRPr lang="en-US" sz="1200" dirty="0"/>
+              <a:rPr lang="en-US" sz="1600" dirty="0" err="1">
+                <a:latin typeface="Arial" pitchFamily="34" charset="0"/>
+                <a:ea typeface="Arial" pitchFamily="34" charset="-122"/>
+                <a:cs typeface="Arial" pitchFamily="34" charset="-120"/>
+              </a:rPr>
+              <a:t>Які</a:t>
+            </a:r>
+            <a:r>
+              <a:rPr lang="en-US" sz="1600" dirty="0">
+                <a:latin typeface="Arial" pitchFamily="34" charset="0"/>
+                <a:ea typeface="Arial" pitchFamily="34" charset="-122"/>
+                <a:cs typeface="Arial" pitchFamily="34" charset="-120"/>
+              </a:rPr>
+              <a:t> </a:t>
+            </a:r>
+            <a:r>
+              <a:rPr lang="en-US" sz="1600" dirty="0" err="1">
+                <a:latin typeface="Arial" pitchFamily="34" charset="0"/>
+                <a:ea typeface="Arial" pitchFamily="34" charset="-122"/>
+                <a:cs typeface="Arial" pitchFamily="34" charset="-120"/>
+              </a:rPr>
+              <a:t>структурні</a:t>
+            </a:r>
+            <a:r>
+              <a:rPr lang="en-US" sz="1600" dirty="0">
+                <a:latin typeface="Arial" pitchFamily="34" charset="0"/>
+                <a:ea typeface="Arial" pitchFamily="34" charset="-122"/>
+                <a:cs typeface="Arial" pitchFamily="34" charset="-120"/>
+              </a:rPr>
+              <a:t> </a:t>
+            </a:r>
+            <a:r>
+              <a:rPr lang="en-US" sz="1600" dirty="0" err="1">
+                <a:latin typeface="Arial" pitchFamily="34" charset="0"/>
+                <a:ea typeface="Arial" pitchFamily="34" charset="-122"/>
+                <a:cs typeface="Arial" pitchFamily="34" charset="-120"/>
+              </a:rPr>
+              <a:t>характеристики</a:t>
+            </a:r>
+            <a:r>
+              <a:rPr lang="en-US" sz="1600" dirty="0">
+                <a:latin typeface="Arial" pitchFamily="34" charset="0"/>
+                <a:ea typeface="Arial" pitchFamily="34" charset="-122"/>
+                <a:cs typeface="Arial" pitchFamily="34" charset="-120"/>
+              </a:rPr>
+              <a:t> (</a:t>
+            </a:r>
+            <a:r>
+              <a:rPr lang="en-US" sz="1600" dirty="0" err="1">
+                <a:latin typeface="Arial" pitchFamily="34" charset="0"/>
+                <a:ea typeface="Arial" pitchFamily="34" charset="-122"/>
+                <a:cs typeface="Arial" pitchFamily="34" charset="-120"/>
+              </a:rPr>
+              <a:t>цифрова</a:t>
+            </a:r>
+            <a:r>
+              <a:rPr lang="en-US" sz="1600" dirty="0">
+                <a:latin typeface="Arial" pitchFamily="34" charset="0"/>
+                <a:ea typeface="Arial" pitchFamily="34" charset="-122"/>
+                <a:cs typeface="Arial" pitchFamily="34" charset="-120"/>
+              </a:rPr>
+              <a:t> </a:t>
+            </a:r>
+            <a:r>
+              <a:rPr lang="en-US" sz="1600" dirty="0" err="1">
+                <a:latin typeface="Arial" pitchFamily="34" charset="0"/>
+                <a:ea typeface="Arial" pitchFamily="34" charset="-122"/>
+                <a:cs typeface="Arial" pitchFamily="34" charset="-120"/>
+              </a:rPr>
+              <a:t>інфраструктура</a:t>
+            </a:r>
+            <a:r>
+              <a:rPr lang="en-US" sz="1600" dirty="0">
+                <a:latin typeface="Arial" pitchFamily="34" charset="0"/>
+                <a:ea typeface="Arial" pitchFamily="34" charset="-122"/>
+                <a:cs typeface="Arial" pitchFamily="34" charset="-120"/>
+              </a:rPr>
+              <a:t>, </a:t>
+            </a:r>
+            <a:r>
+              <a:rPr lang="en-US" sz="1600" dirty="0" err="1">
+                <a:latin typeface="Arial" pitchFamily="34" charset="0"/>
+                <a:ea typeface="Arial" pitchFamily="34" charset="-122"/>
+                <a:cs typeface="Arial" pitchFamily="34" charset="-120"/>
+              </a:rPr>
+              <a:t>доходи</a:t>
+            </a:r>
+            <a:r>
+              <a:rPr lang="en-US" sz="1600" dirty="0">
+                <a:latin typeface="Arial" pitchFamily="34" charset="0"/>
+                <a:ea typeface="Arial" pitchFamily="34" charset="-122"/>
+                <a:cs typeface="Arial" pitchFamily="34" charset="-120"/>
+              </a:rPr>
+              <a:t>, </a:t>
+            </a:r>
+            <a:r>
+              <a:rPr lang="en-US" sz="1600" dirty="0" err="1">
+                <a:latin typeface="Arial" pitchFamily="34" charset="0"/>
+                <a:ea typeface="Arial" pitchFamily="34" charset="-122"/>
+                <a:cs typeface="Arial" pitchFamily="34" charset="-120"/>
+              </a:rPr>
+              <a:t>фінансова</a:t>
+            </a:r>
+            <a:r>
+              <a:rPr lang="en-US" sz="1600" dirty="0">
+                <a:latin typeface="Arial" pitchFamily="34" charset="0"/>
+                <a:ea typeface="Arial" pitchFamily="34" charset="-122"/>
+                <a:cs typeface="Arial" pitchFamily="34" charset="-120"/>
+              </a:rPr>
+              <a:t> </a:t>
+            </a:r>
+            <a:r>
+              <a:rPr lang="en-US" sz="1600" dirty="0" err="1">
+                <a:latin typeface="Arial" pitchFamily="34" charset="0"/>
+                <a:ea typeface="Arial" pitchFamily="34" charset="-122"/>
+                <a:cs typeface="Arial" pitchFamily="34" charset="-120"/>
+              </a:rPr>
+              <a:t>інклюзія</a:t>
+            </a:r>
+            <a:r>
+              <a:rPr lang="en-US" sz="1600" dirty="0">
+                <a:latin typeface="Arial" pitchFamily="34" charset="0"/>
+                <a:ea typeface="Arial" pitchFamily="34" charset="-122"/>
+                <a:cs typeface="Arial" pitchFamily="34" charset="-120"/>
+              </a:rPr>
+              <a:t>, </a:t>
+            </a:r>
+            <a:r>
+              <a:rPr lang="en-US" sz="1600" dirty="0" err="1">
+                <a:latin typeface="Arial" pitchFamily="34" charset="0"/>
+                <a:ea typeface="Arial" pitchFamily="34" charset="-122"/>
+                <a:cs typeface="Arial" pitchFamily="34" charset="-120"/>
+              </a:rPr>
+              <a:t>якість</a:t>
+            </a:r>
+            <a:r>
+              <a:rPr lang="en-US" sz="1600" dirty="0">
+                <a:latin typeface="Arial" pitchFamily="34" charset="0"/>
+                <a:ea typeface="Arial" pitchFamily="34" charset="-122"/>
+                <a:cs typeface="Arial" pitchFamily="34" charset="-120"/>
+              </a:rPr>
+              <a:t> </a:t>
+            </a:r>
+            <a:r>
+              <a:rPr lang="en-US" sz="1600" dirty="0" err="1">
+                <a:latin typeface="Arial" pitchFamily="34" charset="0"/>
+                <a:ea typeface="Arial" pitchFamily="34" charset="-122"/>
+                <a:cs typeface="Arial" pitchFamily="34" charset="-120"/>
+              </a:rPr>
+              <a:t>регуляції</a:t>
+            </a:r>
+            <a:r>
+              <a:rPr lang="en-US" sz="1600" dirty="0">
+                <a:latin typeface="Arial" pitchFamily="34" charset="0"/>
+                <a:ea typeface="Arial" pitchFamily="34" charset="-122"/>
+                <a:cs typeface="Arial" pitchFamily="34" charset="-120"/>
+              </a:rPr>
+              <a:t>) </a:t>
+            </a:r>
+            <a:r>
+              <a:rPr lang="en-US" sz="1600" dirty="0" err="1">
+                <a:latin typeface="Arial" pitchFamily="34" charset="0"/>
+                <a:ea typeface="Arial" pitchFamily="34" charset="-122"/>
+                <a:cs typeface="Arial" pitchFamily="34" charset="-120"/>
+              </a:rPr>
+              <a:t>пов'язані</a:t>
+            </a:r>
+            <a:r>
+              <a:rPr lang="en-US" sz="1600" dirty="0">
+                <a:latin typeface="Arial" pitchFamily="34" charset="0"/>
+                <a:ea typeface="Arial" pitchFamily="34" charset="-122"/>
+                <a:cs typeface="Arial" pitchFamily="34" charset="-120"/>
+              </a:rPr>
+              <a:t> з </a:t>
+            </a:r>
+            <a:r>
+              <a:rPr lang="en-US" sz="1600" dirty="0" err="1">
+                <a:latin typeface="Arial" pitchFamily="34" charset="0"/>
+                <a:ea typeface="Arial" pitchFamily="34" charset="-122"/>
+                <a:cs typeface="Arial" pitchFamily="34" charset="-120"/>
+              </a:rPr>
+              <a:t>більшою</a:t>
+            </a:r>
+            <a:r>
+              <a:rPr lang="en-US" sz="1600" dirty="0">
+                <a:latin typeface="Arial" pitchFamily="34" charset="0"/>
+                <a:ea typeface="Arial" pitchFamily="34" charset="-122"/>
+                <a:cs typeface="Arial" pitchFamily="34" charset="-120"/>
+              </a:rPr>
+              <a:t> </a:t>
+            </a:r>
+            <a:r>
+              <a:rPr lang="en-US" sz="1600" dirty="0" err="1">
+                <a:latin typeface="Arial" pitchFamily="34" charset="0"/>
+                <a:ea typeface="Arial" pitchFamily="34" charset="-122"/>
+                <a:cs typeface="Arial" pitchFamily="34" charset="-120"/>
+              </a:rPr>
+              <a:t>стійкістю</a:t>
+            </a:r>
+            <a:r>
+              <a:rPr lang="uk-UA" sz="1600" dirty="0">
+                <a:latin typeface="Arial" pitchFamily="34" charset="0"/>
+                <a:ea typeface="Arial" pitchFamily="34" charset="-122"/>
+                <a:cs typeface="Arial" pitchFamily="34" charset="-120"/>
+              </a:rPr>
+              <a:t> </a:t>
+            </a:r>
+            <a:r>
+              <a:rPr lang="en-US" sz="1600" dirty="0">
+                <a:latin typeface="Arial" pitchFamily="34" charset="0"/>
+                <a:ea typeface="Arial" pitchFamily="34" charset="-122"/>
+                <a:cs typeface="Arial" pitchFamily="34" charset="-120"/>
+              </a:rPr>
+              <a:t>e-commerce?</a:t>
+            </a:r>
+            <a:endParaRPr lang="en-US" sz="1600" dirty="0"/>
+          </a:p>
+        </p:txBody>
+      </p:sp>
+      <p:sp>
+        <p:nvSpPr>
+          <p:cNvPr id="9" name="TextBox 8">
+            <a:extLst>
+              <a:ext uri="{FF2B5EF4-FFF2-40B4-BE49-F238E27FC236}">
+                <a16:creationId xmlns:a16="http://schemas.microsoft.com/office/drawing/2014/main" id="{937BAF06-3D94-DC97-87E3-A57E8A92DDF9}"/>
+              </a:ext>
+            </a:extLst>
+          </p:cNvPr>
+          <p:cNvSpPr txBox="1"/>
+          <p:nvPr/>
+        </p:nvSpPr>
+        <p:spPr>
+          <a:xfrm>
+            <a:off x="4364736" y="1829948"/>
+            <a:ext cx="3864864" cy="1478931"/>
+          </a:xfrm>
+          <a:prstGeom prst="rect">
+            <a:avLst/>
+          </a:prstGeom>
+          <a:noFill/>
+        </p:spPr>
+        <p:txBody>
+          <a:bodyPr wrap="square">
+            <a:spAutoFit/>
+          </a:bodyPr>
+          <a:lstStyle/>
+          <a:p>
+            <a:pPr>
+              <a:lnSpc>
+                <a:spcPts val="2160"/>
+              </a:lnSpc>
+              <a:buSzPct val="100000"/>
+            </a:pPr>
+            <a:r>
+              <a:rPr lang="en-US" sz="1600" dirty="0">
+                <a:solidFill>
+                  <a:srgbClr val="CBD5E1"/>
+                </a:solidFill>
+                <a:latin typeface="Arial" pitchFamily="34" charset="0"/>
+                <a:ea typeface="Arial" pitchFamily="34" charset="-122"/>
+                <a:cs typeface="Arial" pitchFamily="34" charset="-120"/>
+              </a:rPr>
+              <a:t>❓ </a:t>
+            </a:r>
+            <a:r>
+              <a:rPr lang="uk-UA" sz="1600" b="1" dirty="0">
+                <a:solidFill>
+                  <a:srgbClr val="38BDF8"/>
+                </a:solidFill>
+                <a:latin typeface="Arial" pitchFamily="34" charset="0"/>
+                <a:ea typeface="Arial" pitchFamily="34" charset="-122"/>
+                <a:cs typeface="Arial" pitchFamily="34" charset="-120"/>
+              </a:rPr>
+              <a:t>Перше</a:t>
+            </a:r>
+            <a:r>
+              <a:rPr lang="en-US" sz="1600" b="1" dirty="0">
+                <a:solidFill>
+                  <a:srgbClr val="38BDF8"/>
+                </a:solidFill>
+                <a:latin typeface="Arial" pitchFamily="34" charset="0"/>
+                <a:ea typeface="Arial" pitchFamily="34" charset="-122"/>
+                <a:cs typeface="Arial" pitchFamily="34" charset="-120"/>
+              </a:rPr>
+              <a:t>:</a:t>
+            </a:r>
+            <a:r>
+              <a:rPr lang="en-US" sz="1600" dirty="0">
+                <a:solidFill>
+                  <a:srgbClr val="CBD5E1"/>
+                </a:solidFill>
+                <a:latin typeface="Arial" pitchFamily="34" charset="0"/>
+                <a:ea typeface="Arial" pitchFamily="34" charset="-122"/>
+                <a:cs typeface="Arial" pitchFamily="34" charset="-120"/>
+              </a:rPr>
+              <a:t> </a:t>
+            </a:r>
+            <a:r>
+              <a:rPr lang="en-US" sz="1600" dirty="0" err="1">
+                <a:latin typeface="Arial" pitchFamily="34" charset="0"/>
+                <a:ea typeface="Arial" pitchFamily="34" charset="-122"/>
+                <a:cs typeface="Arial" pitchFamily="34" charset="-120"/>
+              </a:rPr>
+              <a:t>Чим</a:t>
+            </a:r>
+            <a:r>
+              <a:rPr lang="en-US" sz="1600" dirty="0">
+                <a:latin typeface="Arial" pitchFamily="34" charset="0"/>
+                <a:ea typeface="Arial" pitchFamily="34" charset="-122"/>
+                <a:cs typeface="Arial" pitchFamily="34" charset="-120"/>
+              </a:rPr>
+              <a:t> </a:t>
+            </a:r>
+            <a:r>
+              <a:rPr lang="en-US" sz="1600" dirty="0" err="1">
+                <a:latin typeface="Arial" pitchFamily="34" charset="0"/>
+                <a:ea typeface="Arial" pitchFamily="34" charset="-122"/>
+                <a:cs typeface="Arial" pitchFamily="34" charset="-120"/>
+              </a:rPr>
+              <a:t>відрізняються</a:t>
+            </a:r>
+            <a:r>
+              <a:rPr lang="en-US" sz="1600" dirty="0">
+                <a:latin typeface="Arial" pitchFamily="34" charset="0"/>
+                <a:ea typeface="Arial" pitchFamily="34" charset="-122"/>
+                <a:cs typeface="Arial" pitchFamily="34" charset="-120"/>
+              </a:rPr>
+              <a:t> </a:t>
+            </a:r>
+            <a:r>
+              <a:rPr lang="en-US" sz="1600" dirty="0" err="1">
+                <a:latin typeface="Arial" pitchFamily="34" charset="0"/>
+                <a:ea typeface="Arial" pitchFamily="34" charset="-122"/>
+                <a:cs typeface="Arial" pitchFamily="34" charset="-120"/>
+              </a:rPr>
+              <a:t>розвинені</a:t>
+            </a:r>
+            <a:r>
+              <a:rPr lang="en-US" sz="1600" dirty="0">
+                <a:latin typeface="Arial" pitchFamily="34" charset="0"/>
+                <a:ea typeface="Arial" pitchFamily="34" charset="-122"/>
+                <a:cs typeface="Arial" pitchFamily="34" charset="-120"/>
+              </a:rPr>
+              <a:t> й </a:t>
+            </a:r>
+            <a:r>
+              <a:rPr lang="en-US" sz="1600" dirty="0" err="1">
+                <a:latin typeface="Arial" pitchFamily="34" charset="0"/>
+                <a:ea typeface="Arial" pitchFamily="34" charset="-122"/>
+                <a:cs typeface="Arial" pitchFamily="34" charset="-120"/>
+              </a:rPr>
+              <a:t>розвивальні</a:t>
+            </a:r>
+            <a:r>
+              <a:rPr lang="en-US" sz="1600" dirty="0">
+                <a:latin typeface="Arial" pitchFamily="34" charset="0"/>
+                <a:ea typeface="Arial" pitchFamily="34" charset="-122"/>
+                <a:cs typeface="Arial" pitchFamily="34" charset="-120"/>
+              </a:rPr>
+              <a:t> </a:t>
+            </a:r>
+            <a:r>
+              <a:rPr lang="en-US" sz="1600" dirty="0" err="1">
+                <a:latin typeface="Arial" pitchFamily="34" charset="0"/>
+                <a:ea typeface="Arial" pitchFamily="34" charset="-122"/>
+                <a:cs typeface="Arial" pitchFamily="34" charset="-120"/>
+              </a:rPr>
+              <a:t>економіки</a:t>
+            </a:r>
+            <a:r>
+              <a:rPr lang="en-US" sz="1600" dirty="0">
+                <a:latin typeface="Arial" pitchFamily="34" charset="0"/>
+                <a:ea typeface="Arial" pitchFamily="34" charset="-122"/>
+                <a:cs typeface="Arial" pitchFamily="34" charset="-120"/>
+              </a:rPr>
+              <a:t> </a:t>
+            </a:r>
+            <a:r>
+              <a:rPr lang="en-US" sz="1600" dirty="0" err="1">
+                <a:latin typeface="Arial" pitchFamily="34" charset="0"/>
+                <a:ea typeface="Arial" pitchFamily="34" charset="-122"/>
+                <a:cs typeface="Arial" pitchFamily="34" charset="-120"/>
+              </a:rPr>
+              <a:t>за</a:t>
+            </a:r>
+            <a:r>
+              <a:rPr lang="en-US" sz="1600" dirty="0">
+                <a:latin typeface="Arial" pitchFamily="34" charset="0"/>
+                <a:ea typeface="Arial" pitchFamily="34" charset="-122"/>
+                <a:cs typeface="Arial" pitchFamily="34" charset="-120"/>
+              </a:rPr>
+              <a:t> </a:t>
+            </a:r>
+            <a:r>
+              <a:rPr lang="en-US" sz="1600" dirty="0" err="1">
+                <a:latin typeface="Arial" pitchFamily="34" charset="0"/>
+                <a:ea typeface="Arial" pitchFamily="34" charset="-122"/>
+                <a:cs typeface="Arial" pitchFamily="34" charset="-120"/>
+              </a:rPr>
+              <a:t>динамікою</a:t>
+            </a:r>
+            <a:r>
+              <a:rPr lang="en-US" sz="1600" dirty="0">
+                <a:latin typeface="Arial" pitchFamily="34" charset="0"/>
+                <a:ea typeface="Arial" pitchFamily="34" charset="-122"/>
+                <a:cs typeface="Arial" pitchFamily="34" charset="-120"/>
+              </a:rPr>
+              <a:t> e‑commerce у </a:t>
+            </a:r>
+            <a:r>
+              <a:rPr lang="en-US" sz="1600" dirty="0" err="1">
+                <a:latin typeface="Arial" pitchFamily="34" charset="0"/>
+                <a:ea typeface="Arial" pitchFamily="34" charset="-122"/>
+                <a:cs typeface="Arial" pitchFamily="34" charset="-120"/>
+              </a:rPr>
+              <a:t>періоди</a:t>
+            </a:r>
+            <a:r>
+              <a:rPr lang="en-US" sz="1600" dirty="0">
+                <a:latin typeface="Arial" pitchFamily="34" charset="0"/>
+                <a:ea typeface="Arial" pitchFamily="34" charset="-122"/>
+                <a:cs typeface="Arial" pitchFamily="34" charset="-120"/>
+              </a:rPr>
+              <a:t> </a:t>
+            </a:r>
+            <a:r>
+              <a:rPr lang="en-US" sz="1600" dirty="0" err="1">
+                <a:latin typeface="Arial" pitchFamily="34" charset="0"/>
+                <a:ea typeface="Arial" pitchFamily="34" charset="-122"/>
+                <a:cs typeface="Arial" pitchFamily="34" charset="-120"/>
+              </a:rPr>
+              <a:t>шоків</a:t>
+            </a:r>
+            <a:r>
+              <a:rPr lang="en-US" sz="1600" dirty="0">
+                <a:latin typeface="Arial" pitchFamily="34" charset="0"/>
+                <a:ea typeface="Arial" pitchFamily="34" charset="-122"/>
+                <a:cs typeface="Arial" pitchFamily="34" charset="-120"/>
+              </a:rPr>
+              <a:t>?</a:t>
+            </a:r>
+            <a:r>
+              <a:rPr lang="ru-RU" sz="1600" dirty="0">
+                <a:latin typeface="Arial" pitchFamily="34" charset="0"/>
+                <a:ea typeface="Arial" pitchFamily="34" charset="-122"/>
+                <a:cs typeface="Arial" pitchFamily="34" charset="-120"/>
+              </a:rPr>
+              <a:t> </a:t>
+            </a:r>
+            <a:r>
+              <a:rPr lang="ru-RU" sz="1600" dirty="0" err="1">
+                <a:latin typeface="Arial" pitchFamily="34" charset="0"/>
+                <a:ea typeface="Arial" pitchFamily="34" charset="-122"/>
+                <a:cs typeface="Arial" pitchFamily="34" charset="-120"/>
+              </a:rPr>
+              <a:t>Чи</a:t>
+            </a:r>
+            <a:r>
+              <a:rPr lang="ru-RU" sz="1600" dirty="0">
+                <a:latin typeface="Arial" pitchFamily="34" charset="0"/>
+                <a:ea typeface="Arial" pitchFamily="34" charset="-122"/>
+                <a:cs typeface="Arial" pitchFamily="34" charset="-120"/>
+              </a:rPr>
+              <a:t> </a:t>
+            </a:r>
+            <a:r>
+              <a:rPr lang="ru-RU" sz="1600" dirty="0" err="1">
+                <a:latin typeface="Arial" pitchFamily="34" charset="0"/>
+                <a:ea typeface="Arial" pitchFamily="34" charset="-122"/>
+                <a:cs typeface="Arial" pitchFamily="34" charset="-120"/>
+              </a:rPr>
+              <a:t>однаково</a:t>
+            </a:r>
+            <a:r>
+              <a:rPr lang="ru-RU" sz="1600" dirty="0">
+                <a:latin typeface="Arial" pitchFamily="34" charset="0"/>
+                <a:ea typeface="Arial" pitchFamily="34" charset="-122"/>
+                <a:cs typeface="Arial" pitchFamily="34" charset="-120"/>
+              </a:rPr>
+              <a:t> вони </a:t>
+            </a:r>
+            <a:r>
+              <a:rPr lang="ru-RU" sz="1600" dirty="0" err="1">
+                <a:latin typeface="Arial" pitchFamily="34" charset="0"/>
+                <a:ea typeface="Arial" pitchFamily="34" charset="-122"/>
+                <a:cs typeface="Arial" pitchFamily="34" charset="-120"/>
+              </a:rPr>
+              <a:t>реагують</a:t>
+            </a:r>
+            <a:r>
+              <a:rPr lang="ru-RU" sz="1600" dirty="0">
+                <a:latin typeface="Arial" pitchFamily="34" charset="0"/>
+                <a:ea typeface="Arial" pitchFamily="34" charset="-122"/>
+                <a:cs typeface="Arial" pitchFamily="34" charset="-120"/>
+              </a:rPr>
+              <a:t> на них? </a:t>
+            </a:r>
+            <a:endParaRPr lang="en-US" sz="1600" dirty="0"/>
           </a:p>
         </p:txBody>
       </p:sp>
@@ -17226,8 +17918,8 @@
         </p:nvSpPr>
         <p:spPr>
           <a:xfrm>
-            <a:off x="609600" y="609600"/>
-            <a:ext cx="8083296" cy="411361"/>
+            <a:off x="2902132" y="578172"/>
+            <a:ext cx="3169920" cy="411361"/>
           </a:xfrm>
           <a:prstGeom prst="rect">
             <a:avLst/>
@@ -17594,8 +18286,8 @@
         </p:nvSpPr>
         <p:spPr>
           <a:xfrm>
-            <a:off x="609600" y="609600"/>
-            <a:ext cx="8083296" cy="411361"/>
+            <a:off x="2579152" y="691207"/>
+            <a:ext cx="4222133" cy="411361"/>
           </a:xfrm>
           <a:prstGeom prst="rect">
             <a:avLst/>
@@ -17625,7 +18317,7 @@
               <a:t>Ключові</a:t>
             </a:r>
             <a:r>
-              <a:rPr lang="en-US" sz="2700" b="1" dirty="0">
+              <a:rPr lang="uk-UA" sz="2700" b="1" dirty="0">
                 <a:solidFill>
                   <a:srgbClr val="38BDF8"/>
                 </a:solidFill>
@@ -17633,18 +18325,7 @@
                 <a:ea typeface="Arial" pitchFamily="34" charset="-122"/>
                 <a:cs typeface="Arial" pitchFamily="34" charset="-120"/>
               </a:rPr>
-              <a:t> </a:t>
-            </a:r>
-            <a:r>
-              <a:rPr lang="en-US" sz="2700" b="1" dirty="0" err="1">
-                <a:solidFill>
-                  <a:srgbClr val="38BDF8"/>
-                </a:solidFill>
-                <a:latin typeface="Arial" pitchFamily="34" charset="0"/>
-                <a:ea typeface="Arial" pitchFamily="34" charset="-122"/>
-                <a:cs typeface="Arial" pitchFamily="34" charset="-120"/>
-              </a:rPr>
-              <a:t>індикатори</a:t>
+              <a:t> Джерела Даних</a:t>
             </a:r>
             <a:endParaRPr lang="en-US" sz="2700" dirty="0"/>
           </a:p>
@@ -17731,7 +18412,35 @@
                 <a:ea typeface="Arial" pitchFamily="34" charset="-122"/>
                 <a:cs typeface="Arial" pitchFamily="34" charset="-120"/>
               </a:rPr>
-              <a:t>Інтернет-користувачі</a:t>
+              <a:t>Інтернет</a:t>
+            </a:r>
+            <a:r>
+              <a:rPr lang="en-US" sz="900" dirty="0">
+                <a:solidFill>
+                  <a:schemeClr val="tx1">
+                    <a:lumMod val="50000"/>
+                    <a:lumOff val="50000"/>
+                  </a:schemeClr>
+                </a:solidFill>
+                <a:latin typeface="Arial" pitchFamily="34" charset="0"/>
+                <a:ea typeface="Arial" pitchFamily="34" charset="-122"/>
+                <a:cs typeface="Arial" pitchFamily="34" charset="-120"/>
+              </a:rPr>
+              <a:t>-</a:t>
+            </a:r>
+            <a:r>
+              <a:rPr lang="uk-UA" sz="900" dirty="0">
+                <a:solidFill>
+                  <a:schemeClr val="tx1">
+                    <a:lumMod val="50000"/>
+                    <a:lumOff val="50000"/>
+                  </a:schemeClr>
+                </a:solidFill>
+                <a:latin typeface="Arial" pitchFamily="34" charset="0"/>
+                <a:ea typeface="Arial" pitchFamily="34" charset="-122"/>
+                <a:cs typeface="Arial" pitchFamily="34" charset="-120"/>
+              </a:rPr>
+              <a:t>проникнення</a:t>
             </a:r>
             <a:r>
               <a:rPr lang="en-US" sz="900" dirty="0">
@@ -17947,7 +18656,7 @@
                 <a:ea typeface="Arial" pitchFamily="34" charset="-122"/>
                 <a:cs typeface="Arial" pitchFamily="34" charset="-120"/>
               </a:rPr>
-              <a:t> </a:t>
+              <a:t> e-commerce </a:t>
             </a:r>
             <a:r>
               <a:rPr lang="en-US" sz="900" dirty="0" err="1">
@@ -18478,12 +19187,12 @@
               <a:t> </a:t>
             </a:r>
             <a:r>
-              <a:rPr lang="en-US" sz="1200" dirty="0" err="1">
-                <a:latin typeface="Arial" pitchFamily="34" charset="0"/>
-                <a:ea typeface="Arial" pitchFamily="34" charset="-122"/>
-                <a:cs typeface="Arial" pitchFamily="34" charset="-120"/>
-              </a:rPr>
-              <a:t>конфлікту</a:t>
+              <a:rPr lang="uk-UA" sz="1200" dirty="0">
+                <a:latin typeface="Arial" pitchFamily="34" charset="0"/>
+                <a:ea typeface="Arial" pitchFamily="34" charset="-122"/>
+                <a:cs typeface="Arial" pitchFamily="34" charset="-120"/>
+              </a:rPr>
+              <a:t>війни</a:t>
             </a:r>
             <a:r>
               <a:rPr lang="en-US" sz="1200" dirty="0">
@@ -19360,6 +20069,17 @@
               <a:buNone/>
             </a:pPr>
             <a:r>
+              <a:rPr lang="uk-UA" sz="2700" b="1" dirty="0">
+                <a:solidFill>
+                  <a:srgbClr val="38BDF8"/>
+                </a:solidFill>
+                <a:latin typeface="Arial" pitchFamily="34" charset="0"/>
+                <a:ea typeface="Arial" pitchFamily="34" charset="-122"/>
+                <a:cs typeface="Arial" pitchFamily="34" charset="-120"/>
+              </a:rPr>
+              <a:t>Війна</a:t>
+            </a:r>
+            <a:r>
               <a:rPr lang="en-US" sz="2700" b="1" dirty="0">
                 <a:solidFill>
                   <a:srgbClr val="38BDF8"/>
@@ -19368,7 +20088,7 @@
                 <a:ea typeface="Arial" pitchFamily="34" charset="-122"/>
                 <a:cs typeface="Arial" pitchFamily="34" charset="-120"/>
               </a:rPr>
-              <a:t>Конфлікт в Україні: європейський регіон</a:t>
+              <a:t> в Україні: європейський регіон</a:t>
             </a:r>
             <a:endParaRPr lang="en-US" sz="2700" dirty="0"/>
           </a:p>

</xml_diff>